<commit_message>
update CNN doc to version 1.2
</commit_message>
<xml_diff>
--- a/TO_瑩婷03202017.pptx
+++ b/TO_瑩婷03202017.pptx
@@ -3604,7 +3604,7 @@
         </p:spPr>
         <p:txBody>
           <a:bodyPr vert="horz" lIns="91440" tIns="45720" rIns="91440" bIns="45720" rtlCol="0">
-            <a:normAutofit/>
+            <a:normAutofit lnSpcReduction="10000"/>
           </a:bodyPr>
           <a:lstStyle>
             <a:lvl1pPr marL="342900" indent="-342900" algn="l" defTabSz="914400" rtl="0" eaLnBrk="1" latinLnBrk="0" hangingPunct="1">
@@ -3854,8 +3854,61 @@
                   <a:srgbClr val="0000CC"/>
                 </a:solidFill>
               </a:rPr>
-              <a:t>“train fast”?</a:t>
-            </a:r>
+              <a:t>“train fast</a:t>
+            </a:r>
+            <a:r>
+              <a:rPr lang="en-US" altLang="zh-TW" dirty="0" smtClean="0">
+                <a:solidFill>
+                  <a:srgbClr val="0000CC"/>
+                </a:solidFill>
+              </a:rPr>
+              <a:t>”? =&gt; </a:t>
+            </a:r>
+            <a:r>
+              <a:rPr lang="zh-TW" altLang="en-US" dirty="0" smtClean="0">
+                <a:solidFill>
+                  <a:srgbClr val="0000CC"/>
+                </a:solidFill>
+              </a:rPr>
+              <a:t>除非更多描述</a:t>
+            </a:r>
+            <a:r>
+              <a:rPr lang="en-US" altLang="zh-TW" dirty="0" smtClean="0">
+                <a:solidFill>
+                  <a:srgbClr val="0000CC"/>
+                </a:solidFill>
+              </a:rPr>
+              <a:t>”train fast”</a:t>
+            </a:r>
+            <a:r>
+              <a:rPr lang="zh-TW" altLang="en-US" dirty="0" smtClean="0">
+                <a:solidFill>
+                  <a:srgbClr val="0000CC"/>
+                </a:solidFill>
+              </a:rPr>
+              <a:t>，例如舉例比較其他</a:t>
+            </a:r>
+            <a:r>
+              <a:rPr lang="en-US" altLang="zh-TW" dirty="0" smtClean="0">
+                <a:solidFill>
+                  <a:srgbClr val="0000CC"/>
+                </a:solidFill>
+              </a:rPr>
+              <a:t>image set</a:t>
+            </a:r>
+            <a:r>
+              <a:rPr lang="zh-TW" altLang="en-US" dirty="0" smtClean="0">
+                <a:solidFill>
+                  <a:srgbClr val="0000CC"/>
+                </a:solidFill>
+              </a:rPr>
+              <a:t>，不然就是多餘的</a:t>
+            </a:r>
+            <a:endParaRPr lang="en-US" altLang="zh-TW" dirty="0" smtClean="0">
+              <a:solidFill>
+                <a:srgbClr val="0000CC"/>
+              </a:solidFill>
+            </a:endParaRPr>
           </a:p>
         </p:txBody>
       </p:sp>
@@ -7347,7 +7400,47 @@
                   <a:srgbClr val="0000CC"/>
                 </a:solidFill>
               </a:rPr>
-              <a:t>Crop centrally for evaluation from 32x32 to 24x24</a:t>
+              <a:t>Crop </a:t>
+            </a:r>
+            <a:r>
+              <a:rPr lang="en-US" altLang="zh-TW" dirty="0" smtClean="0">
+                <a:solidFill>
+                  <a:srgbClr val="FFC000"/>
+                </a:solidFill>
+              </a:rPr>
+              <a:t>centrally</a:t>
+            </a:r>
+            <a:r>
+              <a:rPr lang="en-US" altLang="zh-TW" dirty="0" smtClean="0">
+                <a:solidFill>
+                  <a:srgbClr val="7030A0"/>
+                </a:solidFill>
+              </a:rPr>
+              <a:t> </a:t>
+            </a:r>
+            <a:r>
+              <a:rPr lang="en-US" altLang="zh-TW" dirty="0" smtClean="0">
+                <a:solidFill>
+                  <a:srgbClr val="0000CC"/>
+                </a:solidFill>
+              </a:rPr>
+              <a:t>for </a:t>
+            </a:r>
+            <a:r>
+              <a:rPr lang="en-US" altLang="zh-TW" b="1" i="1" dirty="0" smtClean="0">
+                <a:solidFill>
+                  <a:srgbClr val="0000CC"/>
+                </a:solidFill>
+              </a:rPr>
+              <a:t>evaluation</a:t>
+            </a:r>
+            <a:r>
+              <a:rPr lang="en-US" altLang="zh-TW" dirty="0" smtClean="0">
+                <a:solidFill>
+                  <a:srgbClr val="0000CC"/>
+                </a:solidFill>
+              </a:rPr>
+              <a:t> from 32x32 to 24x24</a:t>
             </a:r>
             <a:endParaRPr lang="zh-TW" altLang="en-US" dirty="0">
               <a:solidFill>
@@ -10199,7 +10292,41 @@
                   <a:srgbClr val="0000CC"/>
                 </a:solidFill>
               </a:rPr>
-              <a:t>Crop randomly for training from 32x32 to 24x24</a:t>
+              <a:t>Crop </a:t>
+            </a:r>
+            <a:r>
+              <a:rPr lang="en-US" altLang="zh-TW" dirty="0" smtClean="0">
+                <a:solidFill>
+                  <a:schemeClr val="accent5">
+                    <a:lumMod val="75000"/>
+                  </a:schemeClr>
+                </a:solidFill>
+              </a:rPr>
+              <a:t>randomly</a:t>
+            </a:r>
+            <a:r>
+              <a:rPr lang="en-US" altLang="zh-TW" dirty="0" smtClean="0">
+                <a:solidFill>
+                  <a:srgbClr val="0000CC"/>
+                </a:solidFill>
+              </a:rPr>
+              <a:t> for </a:t>
+            </a:r>
+            <a:r>
+              <a:rPr lang="en-US" altLang="zh-TW" b="1" i="1" dirty="0" smtClean="0">
+                <a:solidFill>
+                  <a:srgbClr val="0000CC"/>
+                </a:solidFill>
+              </a:rPr>
+              <a:t>training </a:t>
+            </a:r>
+            <a:r>
+              <a:rPr lang="en-US" altLang="zh-TW" dirty="0" smtClean="0">
+                <a:solidFill>
+                  <a:srgbClr val="0000CC"/>
+                </a:solidFill>
+              </a:rPr>
+              <a:t>from 32x32 to 24x24</a:t>
             </a:r>
             <a:endParaRPr lang="zh-TW" altLang="en-US" dirty="0">
               <a:solidFill>
@@ -12506,11 +12633,6 @@
               </a:rPr>
               <a:t>“model prediction module” (what)</a:t>
             </a:r>
-            <a:endParaRPr lang="en-US" altLang="zh-TW" dirty="0" smtClean="0">
-              <a:solidFill>
-                <a:srgbClr val="0000CC"/>
-              </a:solidFill>
-            </a:endParaRPr>
           </a:p>
         </p:txBody>
       </p:sp>

</xml_diff>